<commit_message>
Updated flow and structure and scripts
</commit_message>
<xml_diff>
--- a/misc/dataflow.pptx
+++ b/misc/dataflow.pptx
@@ -5,12 +5,13 @@
     <p:sldMasterId id="2147483648" r:id="rId1"/>
   </p:sldMasterIdLst>
   <p:notesMasterIdLst>
-    <p:notesMasterId r:id="rId5"/>
+    <p:notesMasterId r:id="rId6"/>
   </p:notesMasterIdLst>
   <p:sldIdLst>
     <p:sldId id="256" r:id="rId2"/>
     <p:sldId id="257" r:id="rId3"/>
     <p:sldId id="258" r:id="rId4"/>
+    <p:sldId id="259" r:id="rId5"/>
   </p:sldIdLst>
   <p:sldSz cx="12192000" cy="6858000"/>
   <p:notesSz cx="6858000" cy="9144000"/>
@@ -199,7 +200,7 @@
           <a:p>
             <a:fld id="{C5B23C63-B32F-AF4C-B9DF-43B06B6336C1}" type="datetimeFigureOut">
               <a:rPr lang="en-GB" smtClean="0"/>
-              <a:t>06/08/2018</a:t>
+              <a:t>21/08/2018</a:t>
             </a:fld>
             <a:endParaRPr lang="en-GB"/>
           </a:p>
@@ -551,6 +552,90 @@
 </p:notes>
 </file>
 
+<file path=ppt/notesSlides/notesSlide2.xml><?xml version="1.0" encoding="utf-8"?>
+<p:notes xmlns:a="http://schemas.openxmlformats.org/drawingml/2006/main" xmlns:r="http://schemas.openxmlformats.org/officeDocument/2006/relationships" xmlns:p="http://schemas.openxmlformats.org/presentationml/2006/main">
+  <p:cSld>
+    <p:spTree>
+      <p:nvGrpSpPr>
+        <p:cNvPr id="1" name=""/>
+        <p:cNvGrpSpPr/>
+        <p:nvPr/>
+      </p:nvGrpSpPr>
+      <p:grpSpPr>
+        <a:xfrm>
+          <a:off x="0" y="0"/>
+          <a:ext cx="0" cy="0"/>
+          <a:chOff x="0" y="0"/>
+          <a:chExt cx="0" cy="0"/>
+        </a:xfrm>
+      </p:grpSpPr>
+      <p:sp>
+        <p:nvSpPr>
+          <p:cNvPr id="2" name="Slide Image Placeholder 1"/>
+          <p:cNvSpPr>
+            <a:spLocks noGrp="1" noRot="1" noChangeAspect="1"/>
+          </p:cNvSpPr>
+          <p:nvPr>
+            <p:ph type="sldImg"/>
+          </p:nvPr>
+        </p:nvSpPr>
+        <p:spPr/>
+      </p:sp>
+      <p:sp>
+        <p:nvSpPr>
+          <p:cNvPr id="3" name="Notes Placeholder 2"/>
+          <p:cNvSpPr>
+            <a:spLocks noGrp="1"/>
+          </p:cNvSpPr>
+          <p:nvPr>
+            <p:ph type="body" idx="1"/>
+          </p:nvPr>
+        </p:nvSpPr>
+        <p:spPr/>
+        <p:txBody>
+          <a:bodyPr/>
+          <a:lstStyle/>
+          <a:p>
+            <a:endParaRPr lang="en-GB" dirty="0"/>
+          </a:p>
+        </p:txBody>
+      </p:sp>
+      <p:sp>
+        <p:nvSpPr>
+          <p:cNvPr id="4" name="Slide Number Placeholder 3"/>
+          <p:cNvSpPr>
+            <a:spLocks noGrp="1"/>
+          </p:cNvSpPr>
+          <p:nvPr>
+            <p:ph type="sldNum" sz="quarter" idx="5"/>
+          </p:nvPr>
+        </p:nvSpPr>
+        <p:spPr/>
+        <p:txBody>
+          <a:bodyPr/>
+          <a:lstStyle/>
+          <a:p>
+            <a:fld id="{10648B58-96C8-414D-B339-07BF9B5B284E}" type="slidenum">
+              <a:rPr lang="en-GB" smtClean="0"/>
+              <a:t>4</a:t>
+            </a:fld>
+            <a:endParaRPr lang="en-GB"/>
+          </a:p>
+        </p:txBody>
+      </p:sp>
+    </p:spTree>
+    <p:extLst>
+      <p:ext uri="{BB962C8B-B14F-4D97-AF65-F5344CB8AC3E}">
+        <p14:creationId xmlns:p14="http://schemas.microsoft.com/office/powerpoint/2010/main" val="3879702293"/>
+      </p:ext>
+    </p:extLst>
+  </p:cSld>
+  <p:clrMapOvr>
+    <a:masterClrMapping/>
+  </p:clrMapOvr>
+</p:notes>
+</file>
+
 <file path=ppt/slideLayouts/slideLayout1.xml><?xml version="1.0" encoding="utf-8"?>
 <p:sldLayout xmlns:a="http://schemas.openxmlformats.org/drawingml/2006/main" xmlns:r="http://schemas.openxmlformats.org/officeDocument/2006/relationships" xmlns:p="http://schemas.openxmlformats.org/presentationml/2006/main" type="title" preserve="1">
   <p:cSld name="Title Slide">
@@ -700,7 +785,7 @@
           <a:p>
             <a:fld id="{9F682711-DC70-F046-A7AB-3B6E062141C5}" type="datetimeFigureOut">
               <a:rPr lang="en-GB" smtClean="0"/>
-              <a:t>06/08/2018</a:t>
+              <a:t>21/08/2018</a:t>
             </a:fld>
             <a:endParaRPr lang="en-GB"/>
           </a:p>
@@ -900,7 +985,7 @@
           <a:p>
             <a:fld id="{9F682711-DC70-F046-A7AB-3B6E062141C5}" type="datetimeFigureOut">
               <a:rPr lang="en-GB" smtClean="0"/>
-              <a:t>06/08/2018</a:t>
+              <a:t>21/08/2018</a:t>
             </a:fld>
             <a:endParaRPr lang="en-GB"/>
           </a:p>
@@ -1110,7 +1195,7 @@
           <a:p>
             <a:fld id="{9F682711-DC70-F046-A7AB-3B6E062141C5}" type="datetimeFigureOut">
               <a:rPr lang="en-GB" smtClean="0"/>
-              <a:t>06/08/2018</a:t>
+              <a:t>21/08/2018</a:t>
             </a:fld>
             <a:endParaRPr lang="en-GB"/>
           </a:p>
@@ -1310,7 +1395,7 @@
           <a:p>
             <a:fld id="{9F682711-DC70-F046-A7AB-3B6E062141C5}" type="datetimeFigureOut">
               <a:rPr lang="en-GB" smtClean="0"/>
-              <a:t>06/08/2018</a:t>
+              <a:t>21/08/2018</a:t>
             </a:fld>
             <a:endParaRPr lang="en-GB"/>
           </a:p>
@@ -1586,7 +1671,7 @@
           <a:p>
             <a:fld id="{9F682711-DC70-F046-A7AB-3B6E062141C5}" type="datetimeFigureOut">
               <a:rPr lang="en-GB" smtClean="0"/>
-              <a:t>06/08/2018</a:t>
+              <a:t>21/08/2018</a:t>
             </a:fld>
             <a:endParaRPr lang="en-GB"/>
           </a:p>
@@ -1854,7 +1939,7 @@
           <a:p>
             <a:fld id="{9F682711-DC70-F046-A7AB-3B6E062141C5}" type="datetimeFigureOut">
               <a:rPr lang="en-GB" smtClean="0"/>
-              <a:t>06/08/2018</a:t>
+              <a:t>21/08/2018</a:t>
             </a:fld>
             <a:endParaRPr lang="en-GB"/>
           </a:p>
@@ -2269,7 +2354,7 @@
           <a:p>
             <a:fld id="{9F682711-DC70-F046-A7AB-3B6E062141C5}" type="datetimeFigureOut">
               <a:rPr lang="en-GB" smtClean="0"/>
-              <a:t>06/08/2018</a:t>
+              <a:t>21/08/2018</a:t>
             </a:fld>
             <a:endParaRPr lang="en-GB"/>
           </a:p>
@@ -2411,7 +2496,7 @@
           <a:p>
             <a:fld id="{9F682711-DC70-F046-A7AB-3B6E062141C5}" type="datetimeFigureOut">
               <a:rPr lang="en-GB" smtClean="0"/>
-              <a:t>06/08/2018</a:t>
+              <a:t>21/08/2018</a:t>
             </a:fld>
             <a:endParaRPr lang="en-GB"/>
           </a:p>
@@ -2524,7 +2609,7 @@
           <a:p>
             <a:fld id="{9F682711-DC70-F046-A7AB-3B6E062141C5}" type="datetimeFigureOut">
               <a:rPr lang="en-GB" smtClean="0"/>
-              <a:t>06/08/2018</a:t>
+              <a:t>21/08/2018</a:t>
             </a:fld>
             <a:endParaRPr lang="en-GB"/>
           </a:p>
@@ -2837,7 +2922,7 @@
           <a:p>
             <a:fld id="{9F682711-DC70-F046-A7AB-3B6E062141C5}" type="datetimeFigureOut">
               <a:rPr lang="en-GB" smtClean="0"/>
-              <a:t>06/08/2018</a:t>
+              <a:t>21/08/2018</a:t>
             </a:fld>
             <a:endParaRPr lang="en-GB"/>
           </a:p>
@@ -3126,7 +3211,7 @@
           <a:p>
             <a:fld id="{9F682711-DC70-F046-A7AB-3B6E062141C5}" type="datetimeFigureOut">
               <a:rPr lang="en-GB" smtClean="0"/>
-              <a:t>06/08/2018</a:t>
+              <a:t>21/08/2018</a:t>
             </a:fld>
             <a:endParaRPr lang="en-GB"/>
           </a:p>
@@ -3369,7 +3454,7 @@
           <a:p>
             <a:fld id="{9F682711-DC70-F046-A7AB-3B6E062141C5}" type="datetimeFigureOut">
               <a:rPr lang="en-GB" smtClean="0"/>
-              <a:t>06/08/2018</a:t>
+              <a:t>21/08/2018</a:t>
             </a:fld>
             <a:endParaRPr lang="en-GB"/>
           </a:p>
@@ -28635,6 +28720,1412 @@
 </p:sld>
 </file>
 
+<file path=ppt/slides/slide4.xml><?xml version="1.0" encoding="utf-8"?>
+<p:sld xmlns:a="http://schemas.openxmlformats.org/drawingml/2006/main" xmlns:r="http://schemas.openxmlformats.org/officeDocument/2006/relationships" xmlns:p="http://schemas.openxmlformats.org/presentationml/2006/main">
+  <p:cSld>
+    <p:spTree>
+      <p:nvGrpSpPr>
+        <p:cNvPr id="1" name=""/>
+        <p:cNvGrpSpPr/>
+        <p:nvPr/>
+      </p:nvGrpSpPr>
+      <p:grpSpPr>
+        <a:xfrm>
+          <a:off x="0" y="0"/>
+          <a:ext cx="0" cy="0"/>
+          <a:chOff x="0" y="0"/>
+          <a:chExt cx="0" cy="0"/>
+        </a:xfrm>
+      </p:grpSpPr>
+      <p:sp>
+        <p:nvSpPr>
+          <p:cNvPr id="37" name="TextBox 36">
+            <a:extLst>
+              <a:ext uri="{FF2B5EF4-FFF2-40B4-BE49-F238E27FC236}">
+                <a16:creationId xmlns:a16="http://schemas.microsoft.com/office/drawing/2014/main" id="{421D4F4B-C03C-694C-95FF-30DED4B70C7B}"/>
+              </a:ext>
+            </a:extLst>
+          </p:cNvPr>
+          <p:cNvSpPr txBox="1"/>
+          <p:nvPr/>
+        </p:nvSpPr>
+        <p:spPr>
+          <a:xfrm rot="20728804">
+            <a:off x="3264951" y="3859621"/>
+            <a:ext cx="439544" cy="253916"/>
+          </a:xfrm>
+          <a:prstGeom prst="rect">
+            <a:avLst/>
+          </a:prstGeom>
+          <a:noFill/>
+        </p:spPr>
+        <p:txBody>
+          <a:bodyPr wrap="none" rtlCol="0">
+            <a:spAutoFit/>
+          </a:bodyPr>
+          <a:lstStyle/>
+          <a:p>
+            <a:r>
+              <a:rPr lang="en-GB" sz="1050" dirty="0"/>
+              <a:t>Pixel</a:t>
+            </a:r>
+          </a:p>
+        </p:txBody>
+      </p:sp>
+      <p:sp>
+        <p:nvSpPr>
+          <p:cNvPr id="4" name="Arc 3">
+            <a:extLst>
+              <a:ext uri="{FF2B5EF4-FFF2-40B4-BE49-F238E27FC236}">
+                <a16:creationId xmlns:a16="http://schemas.microsoft.com/office/drawing/2014/main" id="{FB36911C-1217-9E4D-B4C1-A9F0E5EEA7A5}"/>
+              </a:ext>
+            </a:extLst>
+          </p:cNvPr>
+          <p:cNvSpPr/>
+          <p:nvPr/>
+        </p:nvSpPr>
+        <p:spPr>
+          <a:xfrm>
+            <a:off x="1449659" y="3858324"/>
+            <a:ext cx="7192537" cy="4092497"/>
+          </a:xfrm>
+          <a:prstGeom prst="arc">
+            <a:avLst>
+              <a:gd name="adj1" fmla="val 12757610"/>
+              <a:gd name="adj2" fmla="val 19630855"/>
+            </a:avLst>
+          </a:prstGeom>
+          <a:ln w="28575"/>
+        </p:spPr>
+        <p:style>
+          <a:lnRef idx="1">
+            <a:schemeClr val="accent1"/>
+          </a:lnRef>
+          <a:fillRef idx="0">
+            <a:schemeClr val="accent1"/>
+          </a:fillRef>
+          <a:effectRef idx="0">
+            <a:schemeClr val="accent1"/>
+          </a:effectRef>
+          <a:fontRef idx="minor">
+            <a:schemeClr val="tx1"/>
+          </a:fontRef>
+        </p:style>
+        <p:txBody>
+          <a:bodyPr rtlCol="0" anchor="ctr"/>
+          <a:lstStyle/>
+          <a:p>
+            <a:pPr algn="ctr"/>
+            <a:endParaRPr lang="en-GB"/>
+          </a:p>
+        </p:txBody>
+      </p:sp>
+      <p:cxnSp>
+        <p:nvCxnSpPr>
+          <p:cNvPr id="7" name="Straight Connector 6">
+            <a:extLst>
+              <a:ext uri="{FF2B5EF4-FFF2-40B4-BE49-F238E27FC236}">
+                <a16:creationId xmlns:a16="http://schemas.microsoft.com/office/drawing/2014/main" id="{EB65B854-561B-7342-8144-01958448AF3B}"/>
+              </a:ext>
+            </a:extLst>
+          </p:cNvPr>
+          <p:cNvCxnSpPr>
+            <a:cxnSpLocks/>
+          </p:cNvCxnSpPr>
+          <p:nvPr/>
+        </p:nvCxnSpPr>
+        <p:spPr>
+          <a:xfrm flipV="1">
+            <a:off x="5045927" y="3858324"/>
+            <a:ext cx="0" cy="2888165"/>
+          </a:xfrm>
+          <a:prstGeom prst="line">
+            <a:avLst/>
+          </a:prstGeom>
+        </p:spPr>
+        <p:style>
+          <a:lnRef idx="1">
+            <a:schemeClr val="accent1"/>
+          </a:lnRef>
+          <a:fillRef idx="0">
+            <a:schemeClr val="accent1"/>
+          </a:fillRef>
+          <a:effectRef idx="0">
+            <a:schemeClr val="accent1"/>
+          </a:effectRef>
+          <a:fontRef idx="minor">
+            <a:schemeClr val="tx1"/>
+          </a:fontRef>
+        </p:style>
+      </p:cxnSp>
+      <p:cxnSp>
+        <p:nvCxnSpPr>
+          <p:cNvPr id="9" name="Straight Connector 8">
+            <a:extLst>
+              <a:ext uri="{FF2B5EF4-FFF2-40B4-BE49-F238E27FC236}">
+                <a16:creationId xmlns:a16="http://schemas.microsoft.com/office/drawing/2014/main" id="{CDE1092C-EA3C-1040-8EC5-B39DA3FF242C}"/>
+              </a:ext>
+            </a:extLst>
+          </p:cNvPr>
+          <p:cNvCxnSpPr>
+            <a:cxnSpLocks/>
+          </p:cNvCxnSpPr>
+          <p:nvPr/>
+        </p:nvCxnSpPr>
+        <p:spPr>
+          <a:xfrm flipH="1" flipV="1">
+            <a:off x="3702205" y="4025590"/>
+            <a:ext cx="1343722" cy="2720899"/>
+          </a:xfrm>
+          <a:prstGeom prst="line">
+            <a:avLst/>
+          </a:prstGeom>
+        </p:spPr>
+        <p:style>
+          <a:lnRef idx="1">
+            <a:schemeClr val="accent1"/>
+          </a:lnRef>
+          <a:fillRef idx="0">
+            <a:schemeClr val="accent1"/>
+          </a:fillRef>
+          <a:effectRef idx="0">
+            <a:schemeClr val="accent1"/>
+          </a:effectRef>
+          <a:fontRef idx="minor">
+            <a:schemeClr val="tx1"/>
+          </a:fontRef>
+        </p:style>
+      </p:cxnSp>
+      <p:sp>
+        <p:nvSpPr>
+          <p:cNvPr id="12" name="6-Point Star 11">
+            <a:extLst>
+              <a:ext uri="{FF2B5EF4-FFF2-40B4-BE49-F238E27FC236}">
+                <a16:creationId xmlns:a16="http://schemas.microsoft.com/office/drawing/2014/main" id="{DF0BD2EF-A342-2249-9293-51D4AC8867CC}"/>
+              </a:ext>
+            </a:extLst>
+          </p:cNvPr>
+          <p:cNvSpPr>
+            <a:spLocks noChangeAspect="1"/>
+          </p:cNvSpPr>
+          <p:nvPr/>
+        </p:nvSpPr>
+        <p:spPr>
+          <a:xfrm>
+            <a:off x="4955927" y="111512"/>
+            <a:ext cx="180000" cy="180000"/>
+          </a:xfrm>
+          <a:prstGeom prst="star6">
+            <a:avLst/>
+          </a:prstGeom>
+          <a:solidFill>
+            <a:srgbClr val="FF0000"/>
+          </a:solidFill>
+          <a:ln>
+            <a:noFill/>
+          </a:ln>
+        </p:spPr>
+        <p:style>
+          <a:lnRef idx="2">
+            <a:schemeClr val="accent1">
+              <a:shade val="50000"/>
+            </a:schemeClr>
+          </a:lnRef>
+          <a:fillRef idx="1">
+            <a:schemeClr val="accent1"/>
+          </a:fillRef>
+          <a:effectRef idx="0">
+            <a:schemeClr val="accent1"/>
+          </a:effectRef>
+          <a:fontRef idx="minor">
+            <a:schemeClr val="lt1"/>
+          </a:fontRef>
+        </p:style>
+        <p:txBody>
+          <a:bodyPr rtlCol="0" anchor="ctr"/>
+          <a:lstStyle/>
+          <a:p>
+            <a:pPr algn="ctr"/>
+            <a:endParaRPr lang="en-GB"/>
+          </a:p>
+        </p:txBody>
+      </p:sp>
+      <p:cxnSp>
+        <p:nvCxnSpPr>
+          <p:cNvPr id="14" name="Straight Connector 13">
+            <a:extLst>
+              <a:ext uri="{FF2B5EF4-FFF2-40B4-BE49-F238E27FC236}">
+                <a16:creationId xmlns:a16="http://schemas.microsoft.com/office/drawing/2014/main" id="{3B05A895-338D-6947-A2B5-1B872EFD08B9}"/>
+              </a:ext>
+            </a:extLst>
+          </p:cNvPr>
+          <p:cNvCxnSpPr>
+            <a:stCxn id="12" idx="2"/>
+          </p:cNvCxnSpPr>
+          <p:nvPr/>
+        </p:nvCxnSpPr>
+        <p:spPr>
+          <a:xfrm>
+            <a:off x="5045927" y="291512"/>
+            <a:ext cx="0" cy="3566812"/>
+          </a:xfrm>
+          <a:prstGeom prst="line">
+            <a:avLst/>
+          </a:prstGeom>
+          <a:ln>
+            <a:solidFill>
+              <a:srgbClr val="FF0000"/>
+            </a:solidFill>
+          </a:ln>
+        </p:spPr>
+        <p:style>
+          <a:lnRef idx="1">
+            <a:schemeClr val="accent1"/>
+          </a:lnRef>
+          <a:fillRef idx="0">
+            <a:schemeClr val="accent1"/>
+          </a:fillRef>
+          <a:effectRef idx="0">
+            <a:schemeClr val="accent1"/>
+          </a:effectRef>
+          <a:fontRef idx="minor">
+            <a:schemeClr val="tx1"/>
+          </a:fontRef>
+        </p:style>
+      </p:cxnSp>
+      <p:cxnSp>
+        <p:nvCxnSpPr>
+          <p:cNvPr id="15" name="Straight Connector 14">
+            <a:extLst>
+              <a:ext uri="{FF2B5EF4-FFF2-40B4-BE49-F238E27FC236}">
+                <a16:creationId xmlns:a16="http://schemas.microsoft.com/office/drawing/2014/main" id="{11923410-3996-CA4B-A356-4C47CCF488A3}"/>
+              </a:ext>
+            </a:extLst>
+          </p:cNvPr>
+          <p:cNvCxnSpPr>
+            <a:cxnSpLocks/>
+          </p:cNvCxnSpPr>
+          <p:nvPr/>
+        </p:nvCxnSpPr>
+        <p:spPr>
+          <a:xfrm flipH="1">
+            <a:off x="3702205" y="291512"/>
+            <a:ext cx="1343722" cy="3734078"/>
+          </a:xfrm>
+          <a:prstGeom prst="line">
+            <a:avLst/>
+          </a:prstGeom>
+          <a:ln>
+            <a:solidFill>
+              <a:srgbClr val="FF0000"/>
+            </a:solidFill>
+          </a:ln>
+        </p:spPr>
+        <p:style>
+          <a:lnRef idx="1">
+            <a:schemeClr val="accent1"/>
+          </a:lnRef>
+          <a:fillRef idx="0">
+            <a:schemeClr val="accent1"/>
+          </a:fillRef>
+          <a:effectRef idx="0">
+            <a:schemeClr val="accent1"/>
+          </a:effectRef>
+          <a:fontRef idx="minor">
+            <a:schemeClr val="tx1"/>
+          </a:fontRef>
+        </p:style>
+      </p:cxnSp>
+      <p:cxnSp>
+        <p:nvCxnSpPr>
+          <p:cNvPr id="18" name="Straight Connector 17">
+            <a:extLst>
+              <a:ext uri="{FF2B5EF4-FFF2-40B4-BE49-F238E27FC236}">
+                <a16:creationId xmlns:a16="http://schemas.microsoft.com/office/drawing/2014/main" id="{B9DAD53B-B805-144A-B13E-6ED842CBF27E}"/>
+              </a:ext>
+            </a:extLst>
+          </p:cNvPr>
+          <p:cNvCxnSpPr/>
+          <p:nvPr/>
+        </p:nvCxnSpPr>
+        <p:spPr>
+          <a:xfrm>
+            <a:off x="3702205" y="4025590"/>
+            <a:ext cx="1343722" cy="0"/>
+          </a:xfrm>
+          <a:prstGeom prst="line">
+            <a:avLst/>
+          </a:prstGeom>
+          <a:ln>
+            <a:prstDash val="dash"/>
+          </a:ln>
+        </p:spPr>
+        <p:style>
+          <a:lnRef idx="1">
+            <a:schemeClr val="accent1"/>
+          </a:lnRef>
+          <a:fillRef idx="0">
+            <a:schemeClr val="accent1"/>
+          </a:fillRef>
+          <a:effectRef idx="0">
+            <a:schemeClr val="accent1"/>
+          </a:effectRef>
+          <a:fontRef idx="minor">
+            <a:schemeClr val="tx1"/>
+          </a:fontRef>
+        </p:style>
+      </p:cxnSp>
+      <p:sp>
+        <p:nvSpPr>
+          <p:cNvPr id="19" name="Rectangle 18">
+            <a:extLst>
+              <a:ext uri="{FF2B5EF4-FFF2-40B4-BE49-F238E27FC236}">
+                <a16:creationId xmlns:a16="http://schemas.microsoft.com/office/drawing/2014/main" id="{BFC644EA-EB70-634D-BBBD-3299150C8F65}"/>
+              </a:ext>
+            </a:extLst>
+          </p:cNvPr>
+          <p:cNvSpPr/>
+          <p:nvPr/>
+        </p:nvSpPr>
+        <p:spPr>
+          <a:xfrm>
+            <a:off x="4955927" y="3936458"/>
+            <a:ext cx="90000" cy="180000"/>
+          </a:xfrm>
+          <a:prstGeom prst="rect">
+            <a:avLst/>
+          </a:prstGeom>
+          <a:noFill/>
+          <a:ln w="6350">
+            <a:solidFill>
+              <a:srgbClr val="4372C4"/>
+            </a:solidFill>
+          </a:ln>
+        </p:spPr>
+        <p:style>
+          <a:lnRef idx="2">
+            <a:schemeClr val="accent1">
+              <a:shade val="50000"/>
+            </a:schemeClr>
+          </a:lnRef>
+          <a:fillRef idx="1">
+            <a:schemeClr val="accent1"/>
+          </a:fillRef>
+          <a:effectRef idx="0">
+            <a:schemeClr val="accent1"/>
+          </a:effectRef>
+          <a:fontRef idx="minor">
+            <a:schemeClr val="lt1"/>
+          </a:fontRef>
+        </p:style>
+        <p:txBody>
+          <a:bodyPr rtlCol="0" anchor="ctr"/>
+          <a:lstStyle/>
+          <a:p>
+            <a:pPr algn="ctr"/>
+            <a:endParaRPr lang="en-GB"/>
+          </a:p>
+        </p:txBody>
+      </p:sp>
+      <p:sp>
+        <p:nvSpPr>
+          <p:cNvPr id="21" name="Arc 20">
+            <a:extLst>
+              <a:ext uri="{FF2B5EF4-FFF2-40B4-BE49-F238E27FC236}">
+                <a16:creationId xmlns:a16="http://schemas.microsoft.com/office/drawing/2014/main" id="{D23FA39B-E6A8-D14E-AE2A-7A93A9466AB0}"/>
+              </a:ext>
+            </a:extLst>
+          </p:cNvPr>
+          <p:cNvSpPr/>
+          <p:nvPr/>
+        </p:nvSpPr>
+        <p:spPr>
+          <a:xfrm>
+            <a:off x="4354171" y="5798963"/>
+            <a:ext cx="1203512" cy="1075764"/>
+          </a:xfrm>
+          <a:prstGeom prst="arc">
+            <a:avLst>
+              <a:gd name="adj1" fmla="val 14004331"/>
+              <a:gd name="adj2" fmla="val 16759775"/>
+            </a:avLst>
+          </a:prstGeom>
+        </p:spPr>
+        <p:style>
+          <a:lnRef idx="1">
+            <a:schemeClr val="accent1"/>
+          </a:lnRef>
+          <a:fillRef idx="0">
+            <a:schemeClr val="accent1"/>
+          </a:fillRef>
+          <a:effectRef idx="0">
+            <a:schemeClr val="accent1"/>
+          </a:effectRef>
+          <a:fontRef idx="minor">
+            <a:schemeClr val="tx1"/>
+          </a:fontRef>
+        </p:style>
+        <p:txBody>
+          <a:bodyPr rtlCol="0" anchor="ctr"/>
+          <a:lstStyle/>
+          <a:p>
+            <a:pPr algn="ctr"/>
+            <a:endParaRPr lang="en-GB"/>
+          </a:p>
+        </p:txBody>
+      </p:sp>
+      <p:sp>
+        <p:nvSpPr>
+          <p:cNvPr id="22" name="TextBox 21">
+            <a:extLst>
+              <a:ext uri="{FF2B5EF4-FFF2-40B4-BE49-F238E27FC236}">
+                <a16:creationId xmlns:a16="http://schemas.microsoft.com/office/drawing/2014/main" id="{453143F0-BA70-2C40-BF22-C54D550D5C71}"/>
+              </a:ext>
+            </a:extLst>
+          </p:cNvPr>
+          <p:cNvSpPr txBox="1"/>
+          <p:nvPr/>
+        </p:nvSpPr>
+        <p:spPr>
+          <a:xfrm>
+            <a:off x="4729816" y="5904572"/>
+            <a:ext cx="316112" cy="369332"/>
+          </a:xfrm>
+          <a:prstGeom prst="rect">
+            <a:avLst/>
+          </a:prstGeom>
+          <a:noFill/>
+        </p:spPr>
+        <p:txBody>
+          <a:bodyPr wrap="none" rtlCol="0">
+            <a:spAutoFit/>
+          </a:bodyPr>
+          <a:lstStyle/>
+          <a:p>
+            <a:r>
+              <a:rPr lang="en-GB" dirty="0"/>
+              <a:t>α</a:t>
+            </a:r>
+          </a:p>
+        </p:txBody>
+      </p:sp>
+      <p:sp>
+        <p:nvSpPr>
+          <p:cNvPr id="23" name="Arc 22">
+            <a:extLst>
+              <a:ext uri="{FF2B5EF4-FFF2-40B4-BE49-F238E27FC236}">
+                <a16:creationId xmlns:a16="http://schemas.microsoft.com/office/drawing/2014/main" id="{3C773386-9B6D-AC4D-97A6-2B727E588B54}"/>
+              </a:ext>
+            </a:extLst>
+          </p:cNvPr>
+          <p:cNvSpPr/>
+          <p:nvPr/>
+        </p:nvSpPr>
+        <p:spPr>
+          <a:xfrm>
+            <a:off x="4399171" y="305285"/>
+            <a:ext cx="1203512" cy="1075764"/>
+          </a:xfrm>
+          <a:prstGeom prst="arc">
+            <a:avLst>
+              <a:gd name="adj1" fmla="val 5128818"/>
+              <a:gd name="adj2" fmla="val 7473651"/>
+            </a:avLst>
+          </a:prstGeom>
+          <a:ln>
+            <a:solidFill>
+              <a:srgbClr val="FF0000"/>
+            </a:solidFill>
+          </a:ln>
+        </p:spPr>
+        <p:style>
+          <a:lnRef idx="1">
+            <a:schemeClr val="accent1"/>
+          </a:lnRef>
+          <a:fillRef idx="0">
+            <a:schemeClr val="accent1"/>
+          </a:fillRef>
+          <a:effectRef idx="0">
+            <a:schemeClr val="accent1"/>
+          </a:effectRef>
+          <a:fontRef idx="minor">
+            <a:schemeClr val="tx1"/>
+          </a:fontRef>
+        </p:style>
+        <p:txBody>
+          <a:bodyPr rtlCol="0" anchor="ctr"/>
+          <a:lstStyle/>
+          <a:p>
+            <a:pPr algn="ctr"/>
+            <a:endParaRPr lang="en-GB"/>
+          </a:p>
+        </p:txBody>
+      </p:sp>
+      <p:sp>
+        <p:nvSpPr>
+          <p:cNvPr id="24" name="TextBox 23">
+            <a:extLst>
+              <a:ext uri="{FF2B5EF4-FFF2-40B4-BE49-F238E27FC236}">
+                <a16:creationId xmlns:a16="http://schemas.microsoft.com/office/drawing/2014/main" id="{D3B3BB14-8000-7E4F-A01D-974BA2C52A5E}"/>
+              </a:ext>
+            </a:extLst>
+          </p:cNvPr>
+          <p:cNvSpPr txBox="1"/>
+          <p:nvPr/>
+        </p:nvSpPr>
+        <p:spPr>
+          <a:xfrm>
+            <a:off x="4737829" y="976151"/>
+            <a:ext cx="308098" cy="369332"/>
+          </a:xfrm>
+          <a:prstGeom prst="rect">
+            <a:avLst/>
+          </a:prstGeom>
+          <a:noFill/>
+        </p:spPr>
+        <p:txBody>
+          <a:bodyPr wrap="none" rtlCol="0">
+            <a:spAutoFit/>
+          </a:bodyPr>
+          <a:lstStyle/>
+          <a:p>
+            <a:r>
+              <a:rPr lang="en-GB" dirty="0"/>
+              <a:t>θ</a:t>
+            </a:r>
+          </a:p>
+        </p:txBody>
+      </p:sp>
+      <p:sp>
+        <p:nvSpPr>
+          <p:cNvPr id="26" name="TextBox 25">
+            <a:extLst>
+              <a:ext uri="{FF2B5EF4-FFF2-40B4-BE49-F238E27FC236}">
+                <a16:creationId xmlns:a16="http://schemas.microsoft.com/office/drawing/2014/main" id="{F855528D-E8D8-AD42-B53C-E31EF6C90E40}"/>
+              </a:ext>
+            </a:extLst>
+          </p:cNvPr>
+          <p:cNvSpPr txBox="1"/>
+          <p:nvPr/>
+        </p:nvSpPr>
+        <p:spPr>
+          <a:xfrm rot="1068819">
+            <a:off x="6040490" y="3894786"/>
+            <a:ext cx="1415772" cy="261610"/>
+          </a:xfrm>
+          <a:prstGeom prst="rect">
+            <a:avLst/>
+          </a:prstGeom>
+          <a:noFill/>
+        </p:spPr>
+        <p:txBody>
+          <a:bodyPr wrap="none" rtlCol="0">
+            <a:spAutoFit/>
+          </a:bodyPr>
+          <a:lstStyle/>
+          <a:p>
+            <a:r>
+              <a:rPr lang="en-GB" sz="1050" dirty="0"/>
+              <a:t>Camera Focal Surface</a:t>
+            </a:r>
+          </a:p>
+        </p:txBody>
+      </p:sp>
+      <p:sp>
+        <p:nvSpPr>
+          <p:cNvPr id="27" name="TextBox 26">
+            <a:extLst>
+              <a:ext uri="{FF2B5EF4-FFF2-40B4-BE49-F238E27FC236}">
+                <a16:creationId xmlns:a16="http://schemas.microsoft.com/office/drawing/2014/main" id="{D0F949DF-24A6-4A45-9F70-64D91DF6D324}"/>
+              </a:ext>
+            </a:extLst>
+          </p:cNvPr>
+          <p:cNvSpPr txBox="1"/>
+          <p:nvPr/>
+        </p:nvSpPr>
+        <p:spPr>
+          <a:xfrm>
+            <a:off x="5066917" y="61712"/>
+            <a:ext cx="857927" cy="253916"/>
+          </a:xfrm>
+          <a:prstGeom prst="rect">
+            <a:avLst/>
+          </a:prstGeom>
+          <a:noFill/>
+        </p:spPr>
+        <p:txBody>
+          <a:bodyPr wrap="none" rtlCol="0">
+            <a:spAutoFit/>
+          </a:bodyPr>
+          <a:lstStyle/>
+          <a:p>
+            <a:r>
+              <a:rPr lang="en-GB" sz="1050" dirty="0"/>
+              <a:t>Light-source</a:t>
+            </a:r>
+          </a:p>
+        </p:txBody>
+      </p:sp>
+      <p:sp>
+        <p:nvSpPr>
+          <p:cNvPr id="28" name="TextBox 27">
+            <a:extLst>
+              <a:ext uri="{FF2B5EF4-FFF2-40B4-BE49-F238E27FC236}">
+                <a16:creationId xmlns:a16="http://schemas.microsoft.com/office/drawing/2014/main" id="{35FEA91F-1022-0D41-A420-EB4F46C9A8BF}"/>
+              </a:ext>
+            </a:extLst>
+          </p:cNvPr>
+          <p:cNvSpPr txBox="1"/>
+          <p:nvPr/>
+        </p:nvSpPr>
+        <p:spPr>
+          <a:xfrm>
+            <a:off x="5029033" y="6613117"/>
+            <a:ext cx="1483098" cy="253916"/>
+          </a:xfrm>
+          <a:prstGeom prst="rect">
+            <a:avLst/>
+          </a:prstGeom>
+          <a:noFill/>
+        </p:spPr>
+        <p:txBody>
+          <a:bodyPr wrap="none" rtlCol="0">
+            <a:spAutoFit/>
+          </a:bodyPr>
+          <a:lstStyle/>
+          <a:p>
+            <a:r>
+              <a:rPr lang="en-GB" sz="1050" dirty="0"/>
+              <a:t>Centre of Camera Circle</a:t>
+            </a:r>
+          </a:p>
+        </p:txBody>
+      </p:sp>
+      <p:sp>
+        <p:nvSpPr>
+          <p:cNvPr id="29" name="Oval 28">
+            <a:extLst>
+              <a:ext uri="{FF2B5EF4-FFF2-40B4-BE49-F238E27FC236}">
+                <a16:creationId xmlns:a16="http://schemas.microsoft.com/office/drawing/2014/main" id="{F04373C3-D654-584E-8EA8-BA06E6F1903A}"/>
+              </a:ext>
+            </a:extLst>
+          </p:cNvPr>
+          <p:cNvSpPr/>
+          <p:nvPr/>
+        </p:nvSpPr>
+        <p:spPr>
+          <a:xfrm>
+            <a:off x="4991403" y="6693685"/>
+            <a:ext cx="108284" cy="105609"/>
+          </a:xfrm>
+          <a:prstGeom prst="ellipse">
+            <a:avLst/>
+          </a:prstGeom>
+          <a:ln>
+            <a:noFill/>
+          </a:ln>
+        </p:spPr>
+        <p:style>
+          <a:lnRef idx="2">
+            <a:schemeClr val="accent1">
+              <a:shade val="50000"/>
+            </a:schemeClr>
+          </a:lnRef>
+          <a:fillRef idx="1">
+            <a:schemeClr val="accent1"/>
+          </a:fillRef>
+          <a:effectRef idx="0">
+            <a:schemeClr val="accent1"/>
+          </a:effectRef>
+          <a:fontRef idx="minor">
+            <a:schemeClr val="lt1"/>
+          </a:fontRef>
+        </p:style>
+        <p:txBody>
+          <a:bodyPr rtlCol="0" anchor="ctr"/>
+          <a:lstStyle/>
+          <a:p>
+            <a:pPr algn="ctr"/>
+            <a:endParaRPr lang="en-GB"/>
+          </a:p>
+        </p:txBody>
+      </p:sp>
+      <p:cxnSp>
+        <p:nvCxnSpPr>
+          <p:cNvPr id="34" name="Straight Connector 33">
+            <a:extLst>
+              <a:ext uri="{FF2B5EF4-FFF2-40B4-BE49-F238E27FC236}">
+                <a16:creationId xmlns:a16="http://schemas.microsoft.com/office/drawing/2014/main" id="{888271A9-61CA-0342-B5E9-53BECC9AA750}"/>
+              </a:ext>
+            </a:extLst>
+          </p:cNvPr>
+          <p:cNvCxnSpPr>
+            <a:cxnSpLocks/>
+          </p:cNvCxnSpPr>
+          <p:nvPr/>
+        </p:nvCxnSpPr>
+        <p:spPr>
+          <a:xfrm flipV="1">
+            <a:off x="3644844" y="3995343"/>
+            <a:ext cx="109203" cy="26402"/>
+          </a:xfrm>
+          <a:prstGeom prst="line">
+            <a:avLst/>
+          </a:prstGeom>
+          <a:ln w="38100">
+            <a:solidFill>
+              <a:schemeClr val="tx1"/>
+            </a:solidFill>
+          </a:ln>
+        </p:spPr>
+        <p:style>
+          <a:lnRef idx="1">
+            <a:schemeClr val="accent1"/>
+          </a:lnRef>
+          <a:fillRef idx="0">
+            <a:schemeClr val="accent1"/>
+          </a:fillRef>
+          <a:effectRef idx="0">
+            <a:schemeClr val="accent1"/>
+          </a:effectRef>
+          <a:fontRef idx="minor">
+            <a:schemeClr val="tx1"/>
+          </a:fontRef>
+        </p:style>
+      </p:cxnSp>
+      <p:sp>
+        <p:nvSpPr>
+          <p:cNvPr id="39" name="TextBox 38">
+            <a:extLst>
+              <a:ext uri="{FF2B5EF4-FFF2-40B4-BE49-F238E27FC236}">
+                <a16:creationId xmlns:a16="http://schemas.microsoft.com/office/drawing/2014/main" id="{F548B6AB-CDBC-7D43-AA3E-B0D69B82C350}"/>
+              </a:ext>
+            </a:extLst>
+          </p:cNvPr>
+          <p:cNvSpPr txBox="1"/>
+          <p:nvPr/>
+        </p:nvSpPr>
+        <p:spPr>
+          <a:xfrm>
+            <a:off x="5062821" y="4866389"/>
+            <a:ext cx="385042" cy="369332"/>
+          </a:xfrm>
+          <a:prstGeom prst="rect">
+            <a:avLst/>
+          </a:prstGeom>
+          <a:noFill/>
+        </p:spPr>
+        <p:txBody>
+          <a:bodyPr wrap="none" rtlCol="0">
+            <a:spAutoFit/>
+          </a:bodyPr>
+          <a:lstStyle/>
+          <a:p>
+            <a:r>
+              <a:rPr lang="en-GB" dirty="0"/>
+              <a:t>d</a:t>
+            </a:r>
+            <a:r>
+              <a:rPr lang="en-GB" baseline="-25000" dirty="0"/>
+              <a:t>2</a:t>
+            </a:r>
+            <a:endParaRPr lang="en-GB" dirty="0"/>
+          </a:p>
+        </p:txBody>
+      </p:sp>
+      <p:sp>
+        <p:nvSpPr>
+          <p:cNvPr id="40" name="TextBox 39">
+            <a:extLst>
+              <a:ext uri="{FF2B5EF4-FFF2-40B4-BE49-F238E27FC236}">
+                <a16:creationId xmlns:a16="http://schemas.microsoft.com/office/drawing/2014/main" id="{2AC25E33-DB99-4346-948B-CA83DC67B4F8}"/>
+              </a:ext>
+            </a:extLst>
+          </p:cNvPr>
+          <p:cNvSpPr txBox="1"/>
+          <p:nvPr/>
+        </p:nvSpPr>
+        <p:spPr>
+          <a:xfrm>
+            <a:off x="4998143" y="3784919"/>
+            <a:ext cx="385042" cy="369332"/>
+          </a:xfrm>
+          <a:prstGeom prst="rect">
+            <a:avLst/>
+          </a:prstGeom>
+          <a:noFill/>
+        </p:spPr>
+        <p:txBody>
+          <a:bodyPr wrap="none" rtlCol="0">
+            <a:spAutoFit/>
+          </a:bodyPr>
+          <a:lstStyle/>
+          <a:p>
+            <a:r>
+              <a:rPr lang="en-GB" dirty="0"/>
+              <a:t>d</a:t>
+            </a:r>
+            <a:r>
+              <a:rPr lang="en-GB" baseline="-25000" dirty="0"/>
+              <a:t>1</a:t>
+            </a:r>
+            <a:endParaRPr lang="en-GB" dirty="0"/>
+          </a:p>
+        </p:txBody>
+      </p:sp>
+      <p:sp>
+        <p:nvSpPr>
+          <p:cNvPr id="41" name="TextBox 40">
+            <a:extLst>
+              <a:ext uri="{FF2B5EF4-FFF2-40B4-BE49-F238E27FC236}">
+                <a16:creationId xmlns:a16="http://schemas.microsoft.com/office/drawing/2014/main" id="{5F0B91BD-2B5E-7F47-AF35-157359500709}"/>
+              </a:ext>
+            </a:extLst>
+          </p:cNvPr>
+          <p:cNvSpPr txBox="1"/>
+          <p:nvPr/>
+        </p:nvSpPr>
+        <p:spPr>
+          <a:xfrm>
+            <a:off x="5029033" y="2158551"/>
+            <a:ext cx="372218" cy="369332"/>
+          </a:xfrm>
+          <a:prstGeom prst="rect">
+            <a:avLst/>
+          </a:prstGeom>
+          <a:noFill/>
+        </p:spPr>
+        <p:txBody>
+          <a:bodyPr wrap="none" rtlCol="0">
+            <a:spAutoFit/>
+          </a:bodyPr>
+          <a:lstStyle/>
+          <a:p>
+            <a:r>
+              <a:rPr lang="en-GB" dirty="0"/>
+              <a:t>d</a:t>
+            </a:r>
+            <a:r>
+              <a:rPr lang="en-GB" baseline="-25000" dirty="0"/>
+              <a:t>c</a:t>
+            </a:r>
+            <a:endParaRPr lang="en-GB" dirty="0"/>
+          </a:p>
+        </p:txBody>
+      </p:sp>
+      <p:sp>
+        <p:nvSpPr>
+          <p:cNvPr id="42" name="TextBox 41">
+            <a:extLst>
+              <a:ext uri="{FF2B5EF4-FFF2-40B4-BE49-F238E27FC236}">
+                <a16:creationId xmlns:a16="http://schemas.microsoft.com/office/drawing/2014/main" id="{56783E8F-4A31-7345-A7D6-B1DB98936F68}"/>
+              </a:ext>
+            </a:extLst>
+          </p:cNvPr>
+          <p:cNvSpPr txBox="1"/>
+          <p:nvPr/>
+        </p:nvSpPr>
+        <p:spPr>
+          <a:xfrm>
+            <a:off x="3981953" y="2084952"/>
+            <a:ext cx="367408" cy="369332"/>
+          </a:xfrm>
+          <a:prstGeom prst="rect">
+            <a:avLst/>
+          </a:prstGeom>
+          <a:noFill/>
+        </p:spPr>
+        <p:txBody>
+          <a:bodyPr wrap="none" rtlCol="0">
+            <a:spAutoFit/>
+          </a:bodyPr>
+          <a:lstStyle/>
+          <a:p>
+            <a:r>
+              <a:rPr lang="en-GB" dirty="0" err="1"/>
+              <a:t>d</a:t>
+            </a:r>
+            <a:r>
+              <a:rPr lang="en-GB" baseline="-25000" dirty="0" err="1"/>
+              <a:t>z</a:t>
+            </a:r>
+            <a:endParaRPr lang="en-GB" dirty="0"/>
+          </a:p>
+        </p:txBody>
+      </p:sp>
+      <p:sp>
+        <p:nvSpPr>
+          <p:cNvPr id="43" name="TextBox 42">
+            <a:extLst>
+              <a:ext uri="{FF2B5EF4-FFF2-40B4-BE49-F238E27FC236}">
+                <a16:creationId xmlns:a16="http://schemas.microsoft.com/office/drawing/2014/main" id="{6DEAC719-ADB6-F047-915E-794DABB3A9D4}"/>
+              </a:ext>
+            </a:extLst>
+          </p:cNvPr>
+          <p:cNvSpPr txBox="1"/>
+          <p:nvPr/>
+        </p:nvSpPr>
+        <p:spPr>
+          <a:xfrm>
+            <a:off x="4200113" y="3987196"/>
+            <a:ext cx="284052" cy="369332"/>
+          </a:xfrm>
+          <a:prstGeom prst="rect">
+            <a:avLst/>
+          </a:prstGeom>
+          <a:noFill/>
+        </p:spPr>
+        <p:txBody>
+          <a:bodyPr wrap="none" rtlCol="0">
+            <a:spAutoFit/>
+          </a:bodyPr>
+          <a:lstStyle/>
+          <a:p>
+            <a:r>
+              <a:rPr lang="en-GB" dirty="0"/>
+              <a:t>x</a:t>
+            </a:r>
+          </a:p>
+        </p:txBody>
+      </p:sp>
+      <p:sp>
+        <p:nvSpPr>
+          <p:cNvPr id="44" name="TextBox 43">
+            <a:extLst>
+              <a:ext uri="{FF2B5EF4-FFF2-40B4-BE49-F238E27FC236}">
+                <a16:creationId xmlns:a16="http://schemas.microsoft.com/office/drawing/2014/main" id="{C870FD77-B3AF-E348-BF06-89F6513635B8}"/>
+              </a:ext>
+            </a:extLst>
+          </p:cNvPr>
+          <p:cNvSpPr txBox="1"/>
+          <p:nvPr/>
+        </p:nvSpPr>
+        <p:spPr>
+          <a:xfrm>
+            <a:off x="3981953" y="4986699"/>
+            <a:ext cx="264816" cy="369332"/>
+          </a:xfrm>
+          <a:prstGeom prst="rect">
+            <a:avLst/>
+          </a:prstGeom>
+          <a:noFill/>
+        </p:spPr>
+        <p:txBody>
+          <a:bodyPr wrap="none" rtlCol="0">
+            <a:spAutoFit/>
+          </a:bodyPr>
+          <a:lstStyle/>
+          <a:p>
+            <a:r>
+              <a:rPr lang="en-GB" dirty="0"/>
+              <a:t>r</a:t>
+            </a:r>
+          </a:p>
+        </p:txBody>
+      </p:sp>
+      <p:cxnSp>
+        <p:nvCxnSpPr>
+          <p:cNvPr id="57" name="Straight Connector 56">
+            <a:extLst>
+              <a:ext uri="{FF2B5EF4-FFF2-40B4-BE49-F238E27FC236}">
+                <a16:creationId xmlns:a16="http://schemas.microsoft.com/office/drawing/2014/main" id="{F42E48B8-8F9C-7C46-BD9C-180A677D3644}"/>
+              </a:ext>
+            </a:extLst>
+          </p:cNvPr>
+          <p:cNvCxnSpPr>
+            <a:cxnSpLocks noChangeAspect="1"/>
+          </p:cNvCxnSpPr>
+          <p:nvPr/>
+        </p:nvCxnSpPr>
+        <p:spPr>
+          <a:xfrm flipH="1" flipV="1">
+            <a:off x="3339566" y="3291180"/>
+            <a:ext cx="362638" cy="734304"/>
+          </a:xfrm>
+          <a:prstGeom prst="line">
+            <a:avLst/>
+          </a:prstGeom>
+          <a:ln>
+            <a:solidFill>
+              <a:schemeClr val="tx1"/>
+            </a:solidFill>
+            <a:headEnd type="none" w="med" len="med"/>
+            <a:tailEnd type="triangle" w="med" len="med"/>
+          </a:ln>
+        </p:spPr>
+        <p:style>
+          <a:lnRef idx="1">
+            <a:schemeClr val="accent1"/>
+          </a:lnRef>
+          <a:fillRef idx="0">
+            <a:schemeClr val="accent1"/>
+          </a:fillRef>
+          <a:effectRef idx="0">
+            <a:schemeClr val="accent1"/>
+          </a:effectRef>
+          <a:fontRef idx="minor">
+            <a:schemeClr val="tx1"/>
+          </a:fontRef>
+        </p:style>
+      </p:cxnSp>
+      <p:sp>
+        <p:nvSpPr>
+          <p:cNvPr id="59" name="Arc 58">
+            <a:extLst>
+              <a:ext uri="{FF2B5EF4-FFF2-40B4-BE49-F238E27FC236}">
+                <a16:creationId xmlns:a16="http://schemas.microsoft.com/office/drawing/2014/main" id="{1CF5C861-1721-9245-9322-F074DBF3561D}"/>
+              </a:ext>
+            </a:extLst>
+          </p:cNvPr>
+          <p:cNvSpPr/>
+          <p:nvPr/>
+        </p:nvSpPr>
+        <p:spPr>
+          <a:xfrm>
+            <a:off x="3120000" y="3470662"/>
+            <a:ext cx="1203512" cy="1075764"/>
+          </a:xfrm>
+          <a:prstGeom prst="arc">
+            <a:avLst>
+              <a:gd name="adj1" fmla="val 14448500"/>
+              <a:gd name="adj2" fmla="val 17304444"/>
+            </a:avLst>
+          </a:prstGeom>
+          <a:ln>
+            <a:solidFill>
+              <a:schemeClr val="tx1"/>
+            </a:solidFill>
+          </a:ln>
+        </p:spPr>
+        <p:style>
+          <a:lnRef idx="1">
+            <a:schemeClr val="accent1"/>
+          </a:lnRef>
+          <a:fillRef idx="0">
+            <a:schemeClr val="accent1"/>
+          </a:fillRef>
+          <a:effectRef idx="0">
+            <a:schemeClr val="accent1"/>
+          </a:effectRef>
+          <a:fontRef idx="minor">
+            <a:schemeClr val="tx1"/>
+          </a:fontRef>
+        </p:style>
+        <p:txBody>
+          <a:bodyPr rtlCol="0" anchor="ctr"/>
+          <a:lstStyle/>
+          <a:p>
+            <a:pPr algn="ctr"/>
+            <a:endParaRPr lang="en-GB"/>
+          </a:p>
+        </p:txBody>
+      </p:sp>
+      <p:sp>
+        <p:nvSpPr>
+          <p:cNvPr id="60" name="TextBox 59">
+            <a:extLst>
+              <a:ext uri="{FF2B5EF4-FFF2-40B4-BE49-F238E27FC236}">
+                <a16:creationId xmlns:a16="http://schemas.microsoft.com/office/drawing/2014/main" id="{3A61C585-509A-EA44-9448-F6F017A2F04E}"/>
+              </a:ext>
+            </a:extLst>
+          </p:cNvPr>
+          <p:cNvSpPr txBox="1"/>
+          <p:nvPr/>
+        </p:nvSpPr>
+        <p:spPr>
+          <a:xfrm>
+            <a:off x="3552410" y="3497244"/>
+            <a:ext cx="308098" cy="369332"/>
+          </a:xfrm>
+          <a:prstGeom prst="rect">
+            <a:avLst/>
+          </a:prstGeom>
+          <a:noFill/>
+        </p:spPr>
+        <p:txBody>
+          <a:bodyPr wrap="none" rtlCol="0">
+            <a:spAutoFit/>
+          </a:bodyPr>
+          <a:lstStyle/>
+          <a:p>
+            <a:r>
+              <a:rPr lang="en-GB" dirty="0"/>
+              <a:t>β</a:t>
+            </a:r>
+          </a:p>
+        </p:txBody>
+      </p:sp>
+      <p:cxnSp>
+        <p:nvCxnSpPr>
+          <p:cNvPr id="61" name="Straight Connector 60">
+            <a:extLst>
+              <a:ext uri="{FF2B5EF4-FFF2-40B4-BE49-F238E27FC236}">
+                <a16:creationId xmlns:a16="http://schemas.microsoft.com/office/drawing/2014/main" id="{1E95FA66-1AA3-864D-BB95-754941F215A6}"/>
+              </a:ext>
+            </a:extLst>
+          </p:cNvPr>
+          <p:cNvCxnSpPr>
+            <a:cxnSpLocks noChangeAspect="1"/>
+          </p:cNvCxnSpPr>
+          <p:nvPr/>
+        </p:nvCxnSpPr>
+        <p:spPr>
+          <a:xfrm flipV="1">
+            <a:off x="3694611" y="4021747"/>
+            <a:ext cx="0" cy="1456373"/>
+          </a:xfrm>
+          <a:prstGeom prst="line">
+            <a:avLst/>
+          </a:prstGeom>
+          <a:ln>
+            <a:prstDash val="sysDot"/>
+          </a:ln>
+        </p:spPr>
+        <p:style>
+          <a:lnRef idx="1">
+            <a:schemeClr val="accent1"/>
+          </a:lnRef>
+          <a:fillRef idx="0">
+            <a:schemeClr val="accent1"/>
+          </a:fillRef>
+          <a:effectRef idx="0">
+            <a:schemeClr val="accent1"/>
+          </a:effectRef>
+          <a:fontRef idx="minor">
+            <a:schemeClr val="tx1"/>
+          </a:fontRef>
+        </p:style>
+      </p:cxnSp>
+      <p:cxnSp>
+        <p:nvCxnSpPr>
+          <p:cNvPr id="64" name="Straight Connector 63">
+            <a:extLst>
+              <a:ext uri="{FF2B5EF4-FFF2-40B4-BE49-F238E27FC236}">
+                <a16:creationId xmlns:a16="http://schemas.microsoft.com/office/drawing/2014/main" id="{9F4EA009-DE66-7847-90C3-725084AD38F6}"/>
+              </a:ext>
+            </a:extLst>
+          </p:cNvPr>
+          <p:cNvCxnSpPr>
+            <a:cxnSpLocks noChangeAspect="1"/>
+          </p:cNvCxnSpPr>
+          <p:nvPr/>
+        </p:nvCxnSpPr>
+        <p:spPr>
+          <a:xfrm flipH="1">
+            <a:off x="3174544" y="4026572"/>
+            <a:ext cx="522345" cy="1451548"/>
+          </a:xfrm>
+          <a:prstGeom prst="line">
+            <a:avLst/>
+          </a:prstGeom>
+          <a:ln>
+            <a:solidFill>
+              <a:srgbClr val="FF0000"/>
+            </a:solidFill>
+            <a:prstDash val="sysDot"/>
+          </a:ln>
+        </p:spPr>
+        <p:style>
+          <a:lnRef idx="1">
+            <a:schemeClr val="accent1"/>
+          </a:lnRef>
+          <a:fillRef idx="0">
+            <a:schemeClr val="accent1"/>
+          </a:fillRef>
+          <a:effectRef idx="0">
+            <a:schemeClr val="accent1"/>
+          </a:effectRef>
+          <a:fontRef idx="minor">
+            <a:schemeClr val="tx1"/>
+          </a:fontRef>
+        </p:style>
+      </p:cxnSp>
+      <p:sp>
+        <p:nvSpPr>
+          <p:cNvPr id="66" name="Arc 65">
+            <a:extLst>
+              <a:ext uri="{FF2B5EF4-FFF2-40B4-BE49-F238E27FC236}">
+                <a16:creationId xmlns:a16="http://schemas.microsoft.com/office/drawing/2014/main" id="{38692C21-46CB-FE4B-9485-658AB8FBBE0D}"/>
+              </a:ext>
+            </a:extLst>
+          </p:cNvPr>
+          <p:cNvSpPr/>
+          <p:nvPr/>
+        </p:nvSpPr>
+        <p:spPr>
+          <a:xfrm>
+            <a:off x="3168983" y="3385169"/>
+            <a:ext cx="1203512" cy="1075764"/>
+          </a:xfrm>
+          <a:prstGeom prst="arc">
+            <a:avLst>
+              <a:gd name="adj1" fmla="val 5872318"/>
+              <a:gd name="adj2" fmla="val 6786286"/>
+            </a:avLst>
+          </a:prstGeom>
+          <a:ln>
+            <a:solidFill>
+              <a:srgbClr val="FF0000"/>
+            </a:solidFill>
+            <a:prstDash val="sysDot"/>
+          </a:ln>
+        </p:spPr>
+        <p:style>
+          <a:lnRef idx="1">
+            <a:schemeClr val="accent1"/>
+          </a:lnRef>
+          <a:fillRef idx="0">
+            <a:schemeClr val="accent1"/>
+          </a:fillRef>
+          <a:effectRef idx="0">
+            <a:schemeClr val="accent1"/>
+          </a:effectRef>
+          <a:fontRef idx="minor">
+            <a:schemeClr val="tx1"/>
+          </a:fontRef>
+        </p:style>
+        <p:txBody>
+          <a:bodyPr rtlCol="0" anchor="ctr"/>
+          <a:lstStyle/>
+          <a:p>
+            <a:pPr algn="ctr"/>
+            <a:endParaRPr lang="en-GB"/>
+          </a:p>
+        </p:txBody>
+      </p:sp>
+      <p:sp>
+        <p:nvSpPr>
+          <p:cNvPr id="67" name="TextBox 66">
+            <a:extLst>
+              <a:ext uri="{FF2B5EF4-FFF2-40B4-BE49-F238E27FC236}">
+                <a16:creationId xmlns:a16="http://schemas.microsoft.com/office/drawing/2014/main" id="{C4DEB33B-B6D7-B240-BC69-C76DE7E89ED5}"/>
+              </a:ext>
+            </a:extLst>
+          </p:cNvPr>
+          <p:cNvSpPr txBox="1"/>
+          <p:nvPr/>
+        </p:nvSpPr>
+        <p:spPr>
+          <a:xfrm>
+            <a:off x="3514840" y="4237028"/>
+            <a:ext cx="260008" cy="261610"/>
+          </a:xfrm>
+          <a:prstGeom prst="rect">
+            <a:avLst/>
+          </a:prstGeom>
+          <a:noFill/>
+        </p:spPr>
+        <p:txBody>
+          <a:bodyPr wrap="none" rtlCol="0">
+            <a:spAutoFit/>
+          </a:bodyPr>
+          <a:lstStyle/>
+          <a:p>
+            <a:r>
+              <a:rPr lang="en-GB" sz="1100" dirty="0"/>
+              <a:t>θ</a:t>
+            </a:r>
+          </a:p>
+        </p:txBody>
+      </p:sp>
+      <p:sp>
+        <p:nvSpPr>
+          <p:cNvPr id="68" name="Arc 67">
+            <a:extLst>
+              <a:ext uri="{FF2B5EF4-FFF2-40B4-BE49-F238E27FC236}">
+                <a16:creationId xmlns:a16="http://schemas.microsoft.com/office/drawing/2014/main" id="{EDEB5B3A-6E4A-C049-9D50-AF732D4172F7}"/>
+              </a:ext>
+            </a:extLst>
+          </p:cNvPr>
+          <p:cNvSpPr/>
+          <p:nvPr/>
+        </p:nvSpPr>
+        <p:spPr>
+          <a:xfrm>
+            <a:off x="3099011" y="3276909"/>
+            <a:ext cx="1203512" cy="1075764"/>
+          </a:xfrm>
+          <a:prstGeom prst="arc">
+            <a:avLst>
+              <a:gd name="adj1" fmla="val 4408054"/>
+              <a:gd name="adj2" fmla="val 5395354"/>
+            </a:avLst>
+          </a:prstGeom>
+          <a:ln>
+            <a:prstDash val="sysDot"/>
+          </a:ln>
+        </p:spPr>
+        <p:style>
+          <a:lnRef idx="1">
+            <a:schemeClr val="accent1"/>
+          </a:lnRef>
+          <a:fillRef idx="0">
+            <a:schemeClr val="accent1"/>
+          </a:fillRef>
+          <a:effectRef idx="0">
+            <a:schemeClr val="accent1"/>
+          </a:effectRef>
+          <a:fontRef idx="minor">
+            <a:schemeClr val="tx1"/>
+          </a:fontRef>
+        </p:style>
+        <p:txBody>
+          <a:bodyPr rtlCol="0" anchor="ctr"/>
+          <a:lstStyle/>
+          <a:p>
+            <a:pPr algn="ctr"/>
+            <a:endParaRPr lang="en-GB"/>
+          </a:p>
+        </p:txBody>
+      </p:sp>
+      <p:sp>
+        <p:nvSpPr>
+          <p:cNvPr id="69" name="TextBox 68">
+            <a:extLst>
+              <a:ext uri="{FF2B5EF4-FFF2-40B4-BE49-F238E27FC236}">
+                <a16:creationId xmlns:a16="http://schemas.microsoft.com/office/drawing/2014/main" id="{EF481F16-C117-834E-AAEE-70AC083E9FBE}"/>
+              </a:ext>
+            </a:extLst>
+          </p:cNvPr>
+          <p:cNvSpPr txBox="1"/>
+          <p:nvPr/>
+        </p:nvSpPr>
+        <p:spPr>
+          <a:xfrm>
+            <a:off x="3623796" y="4111265"/>
+            <a:ext cx="264816" cy="261610"/>
+          </a:xfrm>
+          <a:prstGeom prst="rect">
+            <a:avLst/>
+          </a:prstGeom>
+          <a:noFill/>
+        </p:spPr>
+        <p:txBody>
+          <a:bodyPr wrap="none" rtlCol="0">
+            <a:spAutoFit/>
+          </a:bodyPr>
+          <a:lstStyle/>
+          <a:p>
+            <a:r>
+              <a:rPr lang="en-GB" sz="1100" dirty="0"/>
+              <a:t>α</a:t>
+            </a:r>
+          </a:p>
+        </p:txBody>
+      </p:sp>
+    </p:spTree>
+    <p:extLst>
+      <p:ext uri="{BB962C8B-B14F-4D97-AF65-F5344CB8AC3E}">
+        <p14:creationId xmlns:p14="http://schemas.microsoft.com/office/powerpoint/2010/main" val="3499679119"/>
+      </p:ext>
+    </p:extLst>
+  </p:cSld>
+  <p:clrMapOvr>
+    <a:masterClrMapping/>
+  </p:clrMapOvr>
+</p:sld>
+</file>
+
 <file path=ppt/theme/theme1.xml><?xml version="1.0" encoding="utf-8"?>
 <a:theme xmlns:a="http://schemas.openxmlformats.org/drawingml/2006/main" name="Office Theme">
   <a:themeElements>

</xml_diff>